<commit_message>
Readme file and Power Point corrections
</commit_message>
<xml_diff>
--- a/Apresentacao_Angular_Modules_CRUD.pptx
+++ b/Apresentacao_Angular_Modules_CRUD.pptx
@@ -5577,9 +5577,10 @@
               <a:buChar char="●"/>
             </a:pPr>
             <a:r>
-              <a:rPr lang="pt-BR" dirty="0"/>
-              <a:t>Link uteis </a:t>
-            </a:r>
+              <a:rPr lang="pt-BR"/>
+              <a:t>Links úteis </a:t>
+            </a:r>
+            <a:endParaRPr lang="pt-BR" dirty="0"/>
           </a:p>
           <a:p>
             <a:pPr lvl="1" indent="-342900">
@@ -8446,16 +8447,15 @@
                 <a:solidFill>
                   <a:srgbClr val="D73628"/>
                 </a:solidFill>
-              </a:rPr>
-              <a:t>https://github.com/rocketseat-experts-club</a:t>
-            </a:r>
-            <a:r>
-              <a:rPr lang="pt-BR">
-                <a:solidFill>
-                  <a:srgbClr val="D73628"/>
-                </a:solidFill>
-              </a:rPr>
-              <a:t>/angular-crud-modules-2021-09-15</a:t>
+                <a:hlinkClick r:id="rId3">
+                  <a:extLst>
+                    <a:ext uri="{A12FA001-AC4F-418D-AE19-62706E023703}">
+                      <ahyp:hlinkClr xmlns:ahyp="http://schemas.microsoft.com/office/drawing/2018/hyperlinkcolor" val="tx"/>
+                    </a:ext>
+                  </a:extLst>
+                </a:hlinkClick>
+              </a:rPr>
+              <a:t>https://github.com/rocketseat-experts-club/angular-crud-modules-2021-09-15</a:t>
             </a:r>
             <a:endParaRPr lang="pt-BR" dirty="0">
               <a:solidFill>

</xml_diff>